<commit_message>
Alteração de Exemplos na aula 01
</commit_message>
<xml_diff>
--- a/Aulas(Powerpoint)/Aula_01_HTML_CSS.pptx
+++ b/Aulas(Powerpoint)/Aula_01_HTML_CSS.pptx
@@ -223,7 +223,7 @@
           <a:p>
             <a:fld id="{C81E9325-8DA9-46CE-96CB-F32884D73040}" type="datetimeFigureOut">
               <a:rPr lang="pt-BR" smtClean="0"/>
-              <a:t>24/01/2025</a:t>
+              <a:t>27/01/2025</a:t>
             </a:fld>
             <a:endParaRPr lang="pt-BR"/>
           </a:p>
@@ -13052,33 +13052,6 @@
 </file>
 
 <file path=customXml/item1.xml><?xml version="1.0" encoding="utf-8"?>
-<p:properties xmlns:p="http://schemas.microsoft.com/office/2006/metadata/properties" xmlns:xsi="http://www.w3.org/2001/XMLSchema-instance" xmlns:pc="http://schemas.microsoft.com/office/infopath/2007/PartnerControls">
-  <documentManagement>
-    <TaxCatchAll xmlns="49773375-428c-4d2d-86c9-cd3889b58dc5" xsi:nil="true"/>
-    <lcf76f155ced4ddcb4097134ff3c332f xmlns="7da8fe31-9852-41fe-90c9-84e4b16f7cff">
-      <Terms xmlns="http://schemas.microsoft.com/office/infopath/2007/PartnerControls"/>
-    </lcf76f155ced4ddcb4097134ff3c332f>
-    <SharedWithUsers xmlns="49773375-428c-4d2d-86c9-cd3889b58dc5">
-      <UserInfo>
-        <DisplayName>Marcos Paulo Carvalho De Oliveira</DisplayName>
-        <AccountId>9264</AccountId>
-        <AccountType/>
-      </UserInfo>
-    </SharedWithUsers>
-  </documentManagement>
-</p:properties>
-</file>
-
-<file path=customXml/item2.xml><?xml version="1.0" encoding="utf-8"?>
-<?mso-contentType ?>
-<FormTemplates xmlns="http://schemas.microsoft.com/sharepoint/v3/contenttype/forms">
-  <Display>DocumentLibraryForm</Display>
-  <Edit>DocumentLibraryForm</Edit>
-  <New>DocumentLibraryForm</New>
-</FormTemplates>
-</file>
-
-<file path=customXml/item3.xml><?xml version="1.0" encoding="utf-8"?>
 <ct:contentTypeSchema xmlns:ct="http://schemas.microsoft.com/office/2006/metadata/contentType" xmlns:ma="http://schemas.microsoft.com/office/2006/metadata/properties/metaAttributes" ct:_="" ma:_="" ma:contentTypeName="Documento" ma:contentTypeID="0x0101008976E1C1FA8C064DA78478D3B3E9247A" ma:contentTypeVersion="13" ma:contentTypeDescription="Crie um novo documento." ma:contentTypeScope="" ma:versionID="86a61494de0bf00722254f2e834dc98b">
   <xsd:schema xmlns:xsd="http://www.w3.org/2001/XMLSchema" xmlns:xs="http://www.w3.org/2001/XMLSchema" xmlns:p="http://schemas.microsoft.com/office/2006/metadata/properties" xmlns:ns2="7da8fe31-9852-41fe-90c9-84e4b16f7cff" xmlns:ns3="49773375-428c-4d2d-86c9-cd3889b58dc5" targetNamespace="http://schemas.microsoft.com/office/2006/metadata/properties" ma:root="true" ma:fieldsID="3b5039531b2788224b54fc42dba1588f" ns2:_="" ns3:_="">
     <xsd:import namespace="7da8fe31-9852-41fe-90c9-84e4b16f7cff"/>
@@ -13301,33 +13274,34 @@
 </ct:contentTypeSchema>
 </file>
 
-<file path=customXml/itemProps1.xml><?xml version="1.0" encoding="utf-8"?>
-<ds:datastoreItem xmlns:ds="http://schemas.openxmlformats.org/officeDocument/2006/customXml" ds:itemID="{925A2D76-B89D-43D9-81CC-F73DB603259F}">
-  <ds:schemaRefs>
-    <ds:schemaRef ds:uri="http://schemas.microsoft.com/office/2006/metadata/properties"/>
-    <ds:schemaRef ds:uri="http://schemas.microsoft.com/office/infopath/2007/PartnerControls"/>
-    <ds:schemaRef ds:uri="cf5f2b4c-ceff-48b8-acfd-b6c7cb4e26ae"/>
-    <ds:schemaRef ds:uri="230e2427-5d80-4bd2-a9ba-53805cfde8a4"/>
-    <ds:schemaRef ds:uri="1ca3a96b-b23d-4c07-a046-fd4d14ce6620"/>
-    <ds:schemaRef ds:uri="a8a82409-9548-47b3-a351-d7495594f3c8"/>
-    <ds:schemaRef ds:uri="10066eb3-b94a-427c-b89d-d16a460a60fc"/>
-    <ds:schemaRef ds:uri="09644849-26e9-4da7-a8e5-a40617a44d00"/>
-    <ds:schemaRef ds:uri="ce6c6f1b-569f-4b0a-8217-d2c5c7f2840d"/>
-    <ds:schemaRef ds:uri="49773375-428c-4d2d-86c9-cd3889b58dc5"/>
-    <ds:schemaRef ds:uri="7da8fe31-9852-41fe-90c9-84e4b16f7cff"/>
-  </ds:schemaRefs>
-</ds:datastoreItem>
+<file path=customXml/item2.xml><?xml version="1.0" encoding="utf-8"?>
+<?mso-contentType ?>
+<FormTemplates xmlns="http://schemas.microsoft.com/sharepoint/v3/contenttype/forms">
+  <Display>DocumentLibraryForm</Display>
+  <Edit>DocumentLibraryForm</Edit>
+  <New>DocumentLibraryForm</New>
+</FormTemplates>
 </file>
 
-<file path=customXml/itemProps2.xml><?xml version="1.0" encoding="utf-8"?>
-<ds:datastoreItem xmlns:ds="http://schemas.openxmlformats.org/officeDocument/2006/customXml" ds:itemID="{954C6406-39F0-4F36-B3D7-F12E598C1962}">
-  <ds:schemaRefs>
-    <ds:schemaRef ds:uri="http://schemas.microsoft.com/sharepoint/v3/contenttype/forms"/>
-  </ds:schemaRefs>
-</ds:datastoreItem>
+<file path=customXml/item3.xml><?xml version="1.0" encoding="utf-8"?>
+<p:properties xmlns:p="http://schemas.microsoft.com/office/2006/metadata/properties" xmlns:xsi="http://www.w3.org/2001/XMLSchema-instance" xmlns:pc="http://schemas.microsoft.com/office/infopath/2007/PartnerControls">
+  <documentManagement>
+    <TaxCatchAll xmlns="49773375-428c-4d2d-86c9-cd3889b58dc5" xsi:nil="true"/>
+    <lcf76f155ced4ddcb4097134ff3c332f xmlns="7da8fe31-9852-41fe-90c9-84e4b16f7cff">
+      <Terms xmlns="http://schemas.microsoft.com/office/infopath/2007/PartnerControls"/>
+    </lcf76f155ced4ddcb4097134ff3c332f>
+    <SharedWithUsers xmlns="49773375-428c-4d2d-86c9-cd3889b58dc5">
+      <UserInfo>
+        <DisplayName>Marcos Paulo Carvalho De Oliveira</DisplayName>
+        <AccountId>9264</AccountId>
+        <AccountType/>
+      </UserInfo>
+    </SharedWithUsers>
+  </documentManagement>
+</p:properties>
 </file>
 
-<file path=customXml/itemProps3.xml><?xml version="1.0" encoding="utf-8"?>
+<file path=customXml/itemProps1.xml><?xml version="1.0" encoding="utf-8"?>
 <ds:datastoreItem xmlns:ds="http://schemas.openxmlformats.org/officeDocument/2006/customXml" ds:itemID="{77EA5F4C-9DC2-4304-8D08-510CD9C0D409}">
   <ds:schemaRefs>
     <ds:schemaRef ds:uri="http://schemas.microsoft.com/office/2006/metadata/contentType"/>
@@ -13344,4 +13318,30 @@
     <ds:schemaRef ds:uri="http://schemas.microsoft.com/internal/obd"/>
   </ds:schemaRefs>
 </ds:datastoreItem>
+</file>
+
+<file path=customXml/itemProps2.xml><?xml version="1.0" encoding="utf-8"?>
+<ds:datastoreItem xmlns:ds="http://schemas.openxmlformats.org/officeDocument/2006/customXml" ds:itemID="{954C6406-39F0-4F36-B3D7-F12E598C1962}">
+  <ds:schemaRefs>
+    <ds:schemaRef ds:uri="http://schemas.microsoft.com/sharepoint/v3/contenttype/forms"/>
+  </ds:schemaRefs>
+</ds:datastoreItem>
+</file>
+
+<file path=customXml/itemProps3.xml><?xml version="1.0" encoding="utf-8"?>
+<ds:datastoreItem xmlns:ds="http://schemas.openxmlformats.org/officeDocument/2006/customXml" ds:itemID="{925A2D76-B89D-43D9-81CC-F73DB603259F}">
+  <ds:schemaRefs>
+    <ds:schemaRef ds:uri="http://schemas.microsoft.com/office/2006/metadata/properties"/>
+    <ds:schemaRef ds:uri="http://schemas.microsoft.com/office/infopath/2007/PartnerControls"/>
+    <ds:schemaRef ds:uri="cf5f2b4c-ceff-48b8-acfd-b6c7cb4e26ae"/>
+    <ds:schemaRef ds:uri="230e2427-5d80-4bd2-a9ba-53805cfde8a4"/>
+    <ds:schemaRef ds:uri="1ca3a96b-b23d-4c07-a046-fd4d14ce6620"/>
+    <ds:schemaRef ds:uri="a8a82409-9548-47b3-a351-d7495594f3c8"/>
+    <ds:schemaRef ds:uri="10066eb3-b94a-427c-b89d-d16a460a60fc"/>
+    <ds:schemaRef ds:uri="09644849-26e9-4da7-a8e5-a40617a44d00"/>
+    <ds:schemaRef ds:uri="ce6c6f1b-569f-4b0a-8217-d2c5c7f2840d"/>
+    <ds:schemaRef ds:uri="49773375-428c-4d2d-86c9-cd3889b58dc5"/>
+    <ds:schemaRef ds:uri="7da8fe31-9852-41fe-90c9-84e4b16f7cff"/>
+  </ds:schemaRefs>
+</ds:datastoreItem>
 </file>
</xml_diff>